<commit_message>
Correção de alguns dos limites aplicados
Correção de alguns dos limites aplicados que não correspondiam à função de Rastrigin
</commit_message>
<xml_diff>
--- a/AtvPratica02-03_CompEvol/Apresentação.pptx
+++ b/AtvPratica02-03_CompEvol/Apresentação.pptx
@@ -12,6 +12,7 @@
     <p:sldId id="261" r:id="rId6"/>
     <p:sldId id="262" r:id="rId7"/>
     <p:sldId id="263" r:id="rId8"/>
+    <p:sldId id="264" r:id="rId9"/>
   </p:sldIdLst>
   <p:sldSz cx="12192000" cy="6858000"/>
   <p:notesSz cx="6858000" cy="9144000"/>
@@ -443,7 +444,7 @@
             <a:fld id="{5923F103-BC34-4FE4-A40E-EDDEECFDA5D0}" type="datetimeFigureOut">
               <a:rPr lang="en-US" smtClean="0"/>
               <a:pPr/>
-              <a:t>6/5/2018</a:t>
+              <a:t>6/7/2018</a:t>
             </a:fld>
             <a:endParaRPr lang="en-US" dirty="0"/>
           </a:p>
@@ -657,7 +658,7 @@
           <a:p>
             <a:fld id="{53086D93-FCAC-47E0-A2EE-787E62CA814C}" type="datetimeFigureOut">
               <a:rPr lang="en-US" smtClean="0"/>
-              <a:t>6/5/2018</a:t>
+              <a:t>6/7/2018</a:t>
             </a:fld>
             <a:endParaRPr lang="en-US" dirty="0"/>
           </a:p>
@@ -919,7 +920,7 @@
           <a:p>
             <a:fld id="{CDA879A6-0FD0-4734-A311-86BFCA472E6E}" type="datetimeFigureOut">
               <a:rPr lang="en-US" smtClean="0"/>
-              <a:t>6/5/2018</a:t>
+              <a:t>6/7/2018</a:t>
             </a:fld>
             <a:endParaRPr lang="en-US" dirty="0"/>
           </a:p>
@@ -1099,7 +1100,7 @@
           <a:p>
             <a:fld id="{19C9CA7B-DFD4-44B5-8C60-D14B8CD1FB59}" type="datetimeFigureOut">
               <a:rPr lang="en-US" smtClean="0"/>
-              <a:t>6/5/2018</a:t>
+              <a:t>6/7/2018</a:t>
             </a:fld>
             <a:endParaRPr lang="en-US" dirty="0"/>
           </a:p>
@@ -1448,7 +1449,7 @@
           <a:p>
             <a:fld id="{F34E6425-0181-43F2-84FC-787E803FD2F8}" type="datetimeFigureOut">
               <a:rPr lang="en-US" smtClean="0"/>
-              <a:t>6/5/2018</a:t>
+              <a:t>6/7/2018</a:t>
             </a:fld>
             <a:endParaRPr lang="en-US" dirty="0"/>
           </a:p>
@@ -1729,7 +1730,7 @@
           <a:p>
             <a:fld id="{3BDB8791-F1B0-41E7-B7FD-A781E65C4266}" type="datetimeFigureOut">
               <a:rPr lang="en-US" smtClean="0"/>
-              <a:t>6/5/2018</a:t>
+              <a:t>6/7/2018</a:t>
             </a:fld>
             <a:endParaRPr lang="en-US" dirty="0"/>
           </a:p>
@@ -2114,7 +2115,7 @@
           <a:p>
             <a:fld id="{5FDD63B2-E120-4ED8-B27B-C685F510A5FE}" type="datetimeFigureOut">
               <a:rPr lang="en-US" smtClean="0"/>
-              <a:t>6/5/2018</a:t>
+              <a:t>6/7/2018</a:t>
             </a:fld>
             <a:endParaRPr lang="en-US" dirty="0"/>
           </a:p>
@@ -2238,7 +2239,7 @@
           <a:p>
             <a:fld id="{7AA18ACC-A947-437B-A130-35BD54FDF1E9}" type="datetimeFigureOut">
               <a:rPr lang="en-US" smtClean="0"/>
-              <a:t>6/5/2018</a:t>
+              <a:t>6/7/2018</a:t>
             </a:fld>
             <a:endParaRPr lang="en-US" dirty="0"/>
           </a:p>
@@ -2415,7 +2416,7 @@
           <a:p>
             <a:fld id="{7C8D7E02-BCB8-4D50-A234-369438C08659}" type="datetimeFigureOut">
               <a:rPr lang="en-US" smtClean="0"/>
-              <a:t>6/5/2018</a:t>
+              <a:t>6/7/2018</a:t>
             </a:fld>
             <a:endParaRPr lang="en-US" dirty="0"/>
           </a:p>
@@ -2775,7 +2776,7 @@
           <a:p>
             <a:fld id="{76E86A4C-8E40-4F87-A4F0-01A0687C5742}" type="datetimeFigureOut">
               <a:rPr lang="en-US" smtClean="0"/>
-              <a:t>6/5/2018</a:t>
+              <a:t>6/7/2018</a:t>
             </a:fld>
             <a:endParaRPr lang="en-US" dirty="0"/>
           </a:p>
@@ -3163,7 +3164,7 @@
           <a:p>
             <a:fld id="{35E72C73-2D91-4E12-BA25-F0AA0C03599B}" type="datetimeFigureOut">
               <a:rPr lang="en-US" smtClean="0"/>
-              <a:t>6/5/2018</a:t>
+              <a:t>6/7/2018</a:t>
             </a:fld>
             <a:endParaRPr lang="en-US" dirty="0"/>
           </a:p>
@@ -3456,7 +3457,7 @@
           <a:p>
             <a:fld id="{2BE451C3-0FF4-47C4-B829-773ADF60F88C}" type="datetimeFigureOut">
               <a:rPr lang="en-US" smtClean="0"/>
-              <a:t>6/5/2018</a:t>
+              <a:t>6/7/2018</a:t>
             </a:fld>
             <a:endParaRPr lang="en-US" dirty="0"/>
           </a:p>
@@ -4316,7 +4317,7 @@
         <p:spPr/>
         <p:txBody>
           <a:bodyPr>
-            <a:normAutofit fontScale="92500" lnSpcReduction="10000"/>
+            <a:normAutofit/>
           </a:bodyPr>
           <a:lstStyle/>
           <a:p>
@@ -4350,26 +4351,6 @@
             </a:r>
           </a:p>
           <a:p>
-            <a:r>
-              <a:rPr lang="pt-BR" b="1" dirty="0"/>
-              <a:t>Número de gerações (condição de parada): </a:t>
-            </a:r>
-            <a:r>
-              <a:rPr lang="pt-BR" dirty="0"/>
-              <a:t>300.</a:t>
-            </a:r>
-          </a:p>
-          <a:p>
-            <a:r>
-              <a:rPr lang="pt-BR" b="1" dirty="0"/>
-              <a:t>Número de variáveis: </a:t>
-            </a:r>
-            <a:r>
-              <a:rPr lang="pt-BR" dirty="0"/>
-              <a:t>100.</a:t>
-            </a:r>
-          </a:p>
-          <a:p>
             <a:endParaRPr lang="pt-BR" dirty="0"/>
           </a:p>
           <a:p>
@@ -4389,7 +4370,7 @@
             </a:r>
             <a:r>
               <a:rPr lang="pt-BR" dirty="0"/>
-              <a:t>Aleatorizado entre 50% e 100%.</a:t>
+              <a:t>Aleatorizado entre 80% e 100%.</a:t>
             </a:r>
           </a:p>
           <a:p>
@@ -5088,6 +5069,116 @@
     <p:extLst>
       <p:ext uri="{BB962C8B-B14F-4D97-AF65-F5344CB8AC3E}">
         <p14:creationId xmlns:p14="http://schemas.microsoft.com/office/powerpoint/2010/main" val="4155495089"/>
+      </p:ext>
+    </p:extLst>
+  </p:cSld>
+  <p:clrMapOvr>
+    <a:masterClrMapping/>
+  </p:clrMapOvr>
+</p:sld>
+</file>
+
+<file path=ppt/slides/slide8.xml><?xml version="1.0" encoding="utf-8"?>
+<p:sld xmlns:a="http://schemas.openxmlformats.org/drawingml/2006/main" xmlns:r="http://schemas.openxmlformats.org/officeDocument/2006/relationships" xmlns:p="http://schemas.openxmlformats.org/presentationml/2006/main">
+  <p:cSld>
+    <p:spTree>
+      <p:nvGrpSpPr>
+        <p:cNvPr id="1" name=""/>
+        <p:cNvGrpSpPr/>
+        <p:nvPr/>
+      </p:nvGrpSpPr>
+      <p:grpSpPr>
+        <a:xfrm>
+          <a:off x="0" y="0"/>
+          <a:ext cx="0" cy="0"/>
+          <a:chOff x="0" y="0"/>
+          <a:chExt cx="0" cy="0"/>
+        </a:xfrm>
+      </p:grpSpPr>
+      <p:sp>
+        <p:nvSpPr>
+          <p:cNvPr id="2" name="Título 1">
+            <a:extLst>
+              <a:ext uri="{FF2B5EF4-FFF2-40B4-BE49-F238E27FC236}">
+                <a16:creationId xmlns:a16="http://schemas.microsoft.com/office/drawing/2014/main" id="{9D8DF207-D4FE-40A6-A067-F8B88C3846F2}"/>
+              </a:ext>
+            </a:extLst>
+          </p:cNvPr>
+          <p:cNvSpPr>
+            <a:spLocks noGrp="1"/>
+          </p:cNvSpPr>
+          <p:nvPr>
+            <p:ph type="title"/>
+          </p:nvPr>
+        </p:nvSpPr>
+        <p:spPr/>
+        <p:txBody>
+          <a:bodyPr/>
+          <a:lstStyle/>
+          <a:p>
+            <a:endParaRPr lang="pt-BR"/>
+          </a:p>
+        </p:txBody>
+      </p:sp>
+      <p:sp>
+        <p:nvSpPr>
+          <p:cNvPr id="3" name="Espaço Reservado para Conteúdo 2">
+            <a:extLst>
+              <a:ext uri="{FF2B5EF4-FFF2-40B4-BE49-F238E27FC236}">
+                <a16:creationId xmlns:a16="http://schemas.microsoft.com/office/drawing/2014/main" id="{691DB034-AB51-4DCA-82DE-BC67E73285D0}"/>
+              </a:ext>
+            </a:extLst>
+          </p:cNvPr>
+          <p:cNvSpPr>
+            <a:spLocks noGrp="1"/>
+          </p:cNvSpPr>
+          <p:nvPr>
+            <p:ph idx="1"/>
+          </p:nvPr>
+        </p:nvSpPr>
+        <p:spPr/>
+        <p:txBody>
+          <a:bodyPr/>
+          <a:lstStyle/>
+          <a:p>
+            <a:endParaRPr lang="pt-BR"/>
+          </a:p>
+        </p:txBody>
+      </p:sp>
+      <p:pic>
+        <p:nvPicPr>
+          <p:cNvPr id="4" name="Imagem 3">
+            <a:extLst>
+              <a:ext uri="{FF2B5EF4-FFF2-40B4-BE49-F238E27FC236}">
+                <a16:creationId xmlns:a16="http://schemas.microsoft.com/office/drawing/2014/main" id="{15932BFB-D13B-4A77-AB80-023FDD99CA39}"/>
+              </a:ext>
+            </a:extLst>
+          </p:cNvPr>
+          <p:cNvPicPr>
+            <a:picLocks noChangeAspect="1"/>
+          </p:cNvPicPr>
+          <p:nvPr/>
+        </p:nvPicPr>
+        <p:blipFill>
+          <a:blip r:embed="rId2"/>
+          <a:stretch>
+            <a:fillRect/>
+          </a:stretch>
+        </p:blipFill>
+        <p:spPr>
+          <a:xfrm>
+            <a:off x="910880" y="286603"/>
+            <a:ext cx="10393224" cy="6023109"/>
+          </a:xfrm>
+          <a:prstGeom prst="rect">
+            <a:avLst/>
+          </a:prstGeom>
+        </p:spPr>
+      </p:pic>
+    </p:spTree>
+    <p:extLst>
+      <p:ext uri="{BB962C8B-B14F-4D97-AF65-F5344CB8AC3E}">
+        <p14:creationId xmlns:p14="http://schemas.microsoft.com/office/powerpoint/2010/main" val="2883845209"/>
       </p:ext>
     </p:extLst>
   </p:cSld>

</xml_diff>